<commit_message>
Continued work on Genetic Algorithm Architecture
</commit_message>
<xml_diff>
--- a/Using Genetic Algorithm as a Metaheuristic for Search.pptx
+++ b/Using Genetic Algorithm as a Metaheuristic for Search.pptx
@@ -12,8 +12,8 @@
     <p:sldId id="259" r:id="rId6"/>
     <p:sldId id="263" r:id="rId7"/>
     <p:sldId id="260" r:id="rId8"/>
-    <p:sldId id="264" r:id="rId9"/>
-    <p:sldId id="265" r:id="rId10"/>
+    <p:sldId id="265" r:id="rId9"/>
+    <p:sldId id="264" r:id="rId10"/>
     <p:sldId id="262" r:id="rId11"/>
   </p:sldIdLst>
   <p:sldSz cx="12192000" cy="6858000"/>
@@ -175,7 +175,7 @@
           <a:noFill/>
           <a:extLst>
             <a:ext uri="{909E8E84-426E-40dd-AFC4-6F175D3DCCD1}">
-              <a14:hiddenFill xmlns="" xmlns:a14="http://schemas.microsoft.com/office/drawing/2010/main">
+              <a14:hiddenFill xmlns:a14="http://schemas.microsoft.com/office/drawing/2010/main" xmlns="">
                 <a:solidFill>
                   <a:srgbClr val="FFFFFF"/>
                 </a:solidFill>
@@ -235,7 +235,7 @@
             </a:ln>
             <a:extLst>
               <a:ext uri="{91240B29-F687-4f45-9708-019B960494DF}">
-                <a14:hiddenLine xmlns="" xmlns:a14="http://schemas.microsoft.com/office/drawing/2010/main" w="9525">
+                <a14:hiddenLine xmlns:a14="http://schemas.microsoft.com/office/drawing/2010/main" xmlns="" w="9525">
                   <a:solidFill>
                     <a:srgbClr val="000000"/>
                   </a:solidFill>
@@ -325,7 +325,7 @@
             </a:ln>
             <a:extLst>
               <a:ext uri="{91240B29-F687-4f45-9708-019B960494DF}">
-                <a14:hiddenLine xmlns="" xmlns:a14="http://schemas.microsoft.com/office/drawing/2010/main" w="9525">
+                <a14:hiddenLine xmlns:a14="http://schemas.microsoft.com/office/drawing/2010/main" xmlns="" w="9525">
                   <a:solidFill>
                     <a:srgbClr val="000000"/>
                   </a:solidFill>
@@ -415,7 +415,7 @@
             </a:ln>
             <a:extLst>
               <a:ext uri="{91240B29-F687-4f45-9708-019B960494DF}">
-                <a14:hiddenLine xmlns="" xmlns:a14="http://schemas.microsoft.com/office/drawing/2010/main" w="9525">
+                <a14:hiddenLine xmlns:a14="http://schemas.microsoft.com/office/drawing/2010/main" xmlns="" w="9525">
                   <a:solidFill>
                     <a:srgbClr val="000000"/>
                   </a:solidFill>
@@ -449,7 +449,7 @@
             </a:ln>
             <a:extLst>
               <a:ext uri="{91240B29-F687-4f45-9708-019B960494DF}">
-                <a14:hiddenLine xmlns="" xmlns:a14="http://schemas.microsoft.com/office/drawing/2010/main" w="9525">
+                <a14:hiddenLine xmlns:a14="http://schemas.microsoft.com/office/drawing/2010/main" xmlns="" w="9525">
                   <a:solidFill>
                     <a:srgbClr val="000000"/>
                   </a:solidFill>
@@ -539,7 +539,7 @@
             </a:ln>
             <a:extLst>
               <a:ext uri="{91240B29-F687-4f45-9708-019B960494DF}">
-                <a14:hiddenLine xmlns="" xmlns:a14="http://schemas.microsoft.com/office/drawing/2010/main" w="9525">
+                <a14:hiddenLine xmlns:a14="http://schemas.microsoft.com/office/drawing/2010/main" xmlns="" w="9525">
                   <a:solidFill>
                     <a:srgbClr val="000000"/>
                   </a:solidFill>
@@ -601,7 +601,7 @@
             </a:ln>
             <a:extLst>
               <a:ext uri="{91240B29-F687-4f45-9708-019B960494DF}">
-                <a14:hiddenLine xmlns="" xmlns:a14="http://schemas.microsoft.com/office/drawing/2010/main" w="9525">
+                <a14:hiddenLine xmlns:a14="http://schemas.microsoft.com/office/drawing/2010/main" xmlns="" w="9525">
                   <a:solidFill>
                     <a:srgbClr val="000000"/>
                   </a:solidFill>
@@ -663,7 +663,7 @@
             </a:ln>
             <a:extLst>
               <a:ext uri="{91240B29-F687-4f45-9708-019B960494DF}">
-                <a14:hiddenLine xmlns="" xmlns:a14="http://schemas.microsoft.com/office/drawing/2010/main" w="9525">
+                <a14:hiddenLine xmlns:a14="http://schemas.microsoft.com/office/drawing/2010/main" xmlns="" w="9525">
                   <a:solidFill>
                     <a:srgbClr val="000000"/>
                   </a:solidFill>
@@ -753,7 +753,7 @@
             </a:ln>
             <a:extLst>
               <a:ext uri="{91240B29-F687-4f45-9708-019B960494DF}">
-                <a14:hiddenLine xmlns="" xmlns:a14="http://schemas.microsoft.com/office/drawing/2010/main" w="9525">
+                <a14:hiddenLine xmlns:a14="http://schemas.microsoft.com/office/drawing/2010/main" xmlns="" w="9525">
                   <a:solidFill>
                     <a:srgbClr val="000000"/>
                   </a:solidFill>
@@ -815,7 +815,7 @@
             </a:ln>
             <a:extLst>
               <a:ext uri="{91240B29-F687-4f45-9708-019B960494DF}">
-                <a14:hiddenLine xmlns="" xmlns:a14="http://schemas.microsoft.com/office/drawing/2010/main" w="9525">
+                <a14:hiddenLine xmlns:a14="http://schemas.microsoft.com/office/drawing/2010/main" xmlns="" w="9525">
                   <a:solidFill>
                     <a:srgbClr val="000000"/>
                   </a:solidFill>
@@ -877,7 +877,7 @@
             </a:ln>
             <a:extLst>
               <a:ext uri="{91240B29-F687-4f45-9708-019B960494DF}">
-                <a14:hiddenLine xmlns="" xmlns:a14="http://schemas.microsoft.com/office/drawing/2010/main" w="9525">
+                <a14:hiddenLine xmlns:a14="http://schemas.microsoft.com/office/drawing/2010/main" xmlns="" w="9525">
                   <a:solidFill>
                     <a:srgbClr val="000000"/>
                   </a:solidFill>
@@ -967,7 +967,7 @@
             </a:ln>
             <a:extLst>
               <a:ext uri="{91240B29-F687-4f45-9708-019B960494DF}">
-                <a14:hiddenLine xmlns="" xmlns:a14="http://schemas.microsoft.com/office/drawing/2010/main" w="9525">
+                <a14:hiddenLine xmlns:a14="http://schemas.microsoft.com/office/drawing/2010/main" xmlns="" w="9525">
                   <a:solidFill>
                     <a:srgbClr val="000000"/>
                   </a:solidFill>
@@ -1057,7 +1057,7 @@
             </a:ln>
             <a:extLst>
               <a:ext uri="{91240B29-F687-4f45-9708-019B960494DF}">
-                <a14:hiddenLine xmlns="" xmlns:a14="http://schemas.microsoft.com/office/drawing/2010/main" w="9525">
+                <a14:hiddenLine xmlns:a14="http://schemas.microsoft.com/office/drawing/2010/main" xmlns="" w="9525">
                   <a:solidFill>
                     <a:srgbClr val="000000"/>
                   </a:solidFill>
@@ -1119,7 +1119,7 @@
             </a:ln>
             <a:extLst>
               <a:ext uri="{91240B29-F687-4f45-9708-019B960494DF}">
-                <a14:hiddenLine xmlns="" xmlns:a14="http://schemas.microsoft.com/office/drawing/2010/main" w="9525">
+                <a14:hiddenLine xmlns:a14="http://schemas.microsoft.com/office/drawing/2010/main" xmlns="" w="9525">
                   <a:solidFill>
                     <a:srgbClr val="000000"/>
                   </a:solidFill>
@@ -1229,7 +1229,7 @@
             </a:ln>
             <a:extLst>
               <a:ext uri="{91240B29-F687-4f45-9708-019B960494DF}">
-                <a14:hiddenLine xmlns="" xmlns:a14="http://schemas.microsoft.com/office/drawing/2010/main" w="9525">
+                <a14:hiddenLine xmlns:a14="http://schemas.microsoft.com/office/drawing/2010/main" xmlns="" w="9525">
                   <a:solidFill>
                     <a:srgbClr val="000000"/>
                   </a:solidFill>
@@ -1291,7 +1291,7 @@
             </a:ln>
             <a:extLst>
               <a:ext uri="{91240B29-F687-4f45-9708-019B960494DF}">
-                <a14:hiddenLine xmlns="" xmlns:a14="http://schemas.microsoft.com/office/drawing/2010/main" w="9525">
+                <a14:hiddenLine xmlns:a14="http://schemas.microsoft.com/office/drawing/2010/main" xmlns="" w="9525">
                   <a:solidFill>
                     <a:srgbClr val="000000"/>
                   </a:solidFill>
@@ -1381,7 +1381,7 @@
             </a:ln>
             <a:extLst>
               <a:ext uri="{91240B29-F687-4f45-9708-019B960494DF}">
-                <a14:hiddenLine xmlns="" xmlns:a14="http://schemas.microsoft.com/office/drawing/2010/main" w="9525">
+                <a14:hiddenLine xmlns:a14="http://schemas.microsoft.com/office/drawing/2010/main" xmlns="" w="9525">
                   <a:solidFill>
                     <a:srgbClr val="000000"/>
                   </a:solidFill>
@@ -1471,7 +1471,7 @@
             </a:ln>
             <a:extLst>
               <a:ext uri="{91240B29-F687-4f45-9708-019B960494DF}">
-                <a14:hiddenLine xmlns="" xmlns:a14="http://schemas.microsoft.com/office/drawing/2010/main" w="9525">
+                <a14:hiddenLine xmlns:a14="http://schemas.microsoft.com/office/drawing/2010/main" xmlns="" w="9525">
                   <a:solidFill>
                     <a:srgbClr val="000000"/>
                   </a:solidFill>
@@ -1533,7 +1533,7 @@
             </a:ln>
             <a:extLst>
               <a:ext uri="{91240B29-F687-4f45-9708-019B960494DF}">
-                <a14:hiddenLine xmlns="" xmlns:a14="http://schemas.microsoft.com/office/drawing/2010/main" w="9525">
+                <a14:hiddenLine xmlns:a14="http://schemas.microsoft.com/office/drawing/2010/main" xmlns="" w="9525">
                   <a:solidFill>
                     <a:srgbClr val="000000"/>
                   </a:solidFill>
@@ -1623,7 +1623,7 @@
             </a:ln>
             <a:extLst>
               <a:ext uri="{91240B29-F687-4f45-9708-019B960494DF}">
-                <a14:hiddenLine xmlns="" xmlns:a14="http://schemas.microsoft.com/office/drawing/2010/main" w="9525">
+                <a14:hiddenLine xmlns:a14="http://schemas.microsoft.com/office/drawing/2010/main" xmlns="" w="9525">
                   <a:solidFill>
                     <a:srgbClr val="000000"/>
                   </a:solidFill>
@@ -1713,7 +1713,7 @@
             </a:ln>
             <a:extLst>
               <a:ext uri="{91240B29-F687-4f45-9708-019B960494DF}">
-                <a14:hiddenLine xmlns="" xmlns:a14="http://schemas.microsoft.com/office/drawing/2010/main" w="9525">
+                <a14:hiddenLine xmlns:a14="http://schemas.microsoft.com/office/drawing/2010/main" xmlns="" w="9525">
                   <a:solidFill>
                     <a:srgbClr val="000000"/>
                   </a:solidFill>
@@ -1769,7 +1769,7 @@
             </a:ln>
             <a:extLst>
               <a:ext uri="{91240B29-F687-4f45-9708-019B960494DF}">
-                <a14:hiddenLine xmlns="" xmlns:a14="http://schemas.microsoft.com/office/drawing/2010/main" w="9525">
+                <a14:hiddenLine xmlns:a14="http://schemas.microsoft.com/office/drawing/2010/main" xmlns="" w="9525">
                   <a:solidFill>
                     <a:srgbClr val="000000"/>
                   </a:solidFill>
@@ -1859,7 +1859,7 @@
             </a:ln>
             <a:extLst>
               <a:ext uri="{91240B29-F687-4f45-9708-019B960494DF}">
-                <a14:hiddenLine xmlns="" xmlns:a14="http://schemas.microsoft.com/office/drawing/2010/main" w="9525">
+                <a14:hiddenLine xmlns:a14="http://schemas.microsoft.com/office/drawing/2010/main" xmlns="" w="9525">
                   <a:solidFill>
                     <a:srgbClr val="000000"/>
                   </a:solidFill>
@@ -1915,7 +1915,7 @@
             </a:ln>
             <a:extLst>
               <a:ext uri="{91240B29-F687-4f45-9708-019B960494DF}">
-                <a14:hiddenLine xmlns="" xmlns:a14="http://schemas.microsoft.com/office/drawing/2010/main" w="9525">
+                <a14:hiddenLine xmlns:a14="http://schemas.microsoft.com/office/drawing/2010/main" xmlns="" w="9525">
                   <a:solidFill>
                     <a:srgbClr val="000000"/>
                   </a:solidFill>
@@ -2005,7 +2005,7 @@
             </a:ln>
             <a:extLst>
               <a:ext uri="{91240B29-F687-4f45-9708-019B960494DF}">
-                <a14:hiddenLine xmlns="" xmlns:a14="http://schemas.microsoft.com/office/drawing/2010/main" w="9525">
+                <a14:hiddenLine xmlns:a14="http://schemas.microsoft.com/office/drawing/2010/main" xmlns="" w="9525">
                   <a:solidFill>
                     <a:srgbClr val="000000"/>
                   </a:solidFill>
@@ -2073,7 +2073,7 @@
             </a:ln>
             <a:extLst>
               <a:ext uri="{91240B29-F687-4f45-9708-019B960494DF}">
-                <a14:hiddenLine xmlns="" xmlns:a14="http://schemas.microsoft.com/office/drawing/2010/main" w="9525">
+                <a14:hiddenLine xmlns:a14="http://schemas.microsoft.com/office/drawing/2010/main" xmlns="" w="9525">
                   <a:solidFill>
                     <a:srgbClr val="000000"/>
                   </a:solidFill>
@@ -2163,7 +2163,7 @@
             </a:ln>
             <a:extLst>
               <a:ext uri="{91240B29-F687-4f45-9708-019B960494DF}">
-                <a14:hiddenLine xmlns="" xmlns:a14="http://schemas.microsoft.com/office/drawing/2010/main" w="9525">
+                <a14:hiddenLine xmlns:a14="http://schemas.microsoft.com/office/drawing/2010/main" xmlns="" w="9525">
                   <a:solidFill>
                     <a:srgbClr val="000000"/>
                   </a:solidFill>
@@ -2231,7 +2231,7 @@
             </a:ln>
             <a:extLst>
               <a:ext uri="{91240B29-F687-4f45-9708-019B960494DF}">
-                <a14:hiddenLine xmlns="" xmlns:a14="http://schemas.microsoft.com/office/drawing/2010/main" w="9525">
+                <a14:hiddenLine xmlns:a14="http://schemas.microsoft.com/office/drawing/2010/main" xmlns="" w="9525">
                   <a:solidFill>
                     <a:srgbClr val="000000"/>
                   </a:solidFill>
@@ -2321,7 +2321,7 @@
             </a:ln>
             <a:extLst>
               <a:ext uri="{91240B29-F687-4f45-9708-019B960494DF}">
-                <a14:hiddenLine xmlns="" xmlns:a14="http://schemas.microsoft.com/office/drawing/2010/main" w="9525">
+                <a14:hiddenLine xmlns:a14="http://schemas.microsoft.com/office/drawing/2010/main" xmlns="" w="9525">
                   <a:solidFill>
                     <a:srgbClr val="000000"/>
                   </a:solidFill>
@@ -2355,7 +2355,7 @@
             </a:ln>
             <a:extLst>
               <a:ext uri="{91240B29-F687-4f45-9708-019B960494DF}">
-                <a14:hiddenLine xmlns="" xmlns:a14="http://schemas.microsoft.com/office/drawing/2010/main" w="9525">
+                <a14:hiddenLine xmlns:a14="http://schemas.microsoft.com/office/drawing/2010/main" xmlns="" w="9525">
                   <a:solidFill>
                     <a:srgbClr val="000000"/>
                   </a:solidFill>
@@ -2445,7 +2445,7 @@
             </a:ln>
             <a:extLst>
               <a:ext uri="{91240B29-F687-4f45-9708-019B960494DF}">
-                <a14:hiddenLine xmlns="" xmlns:a14="http://schemas.microsoft.com/office/drawing/2010/main" w="9525">
+                <a14:hiddenLine xmlns:a14="http://schemas.microsoft.com/office/drawing/2010/main" xmlns="" w="9525">
                   <a:solidFill>
                     <a:srgbClr val="000000"/>
                   </a:solidFill>
@@ -2507,7 +2507,7 @@
             </a:ln>
             <a:extLst>
               <a:ext uri="{91240B29-F687-4f45-9708-019B960494DF}">
-                <a14:hiddenLine xmlns="" xmlns:a14="http://schemas.microsoft.com/office/drawing/2010/main" w="9525">
+                <a14:hiddenLine xmlns:a14="http://schemas.microsoft.com/office/drawing/2010/main" xmlns="" w="9525">
                   <a:solidFill>
                     <a:srgbClr val="000000"/>
                   </a:solidFill>
@@ -2569,7 +2569,7 @@
             </a:ln>
             <a:extLst>
               <a:ext uri="{91240B29-F687-4f45-9708-019B960494DF}">
-                <a14:hiddenLine xmlns="" xmlns:a14="http://schemas.microsoft.com/office/drawing/2010/main" w="9525">
+                <a14:hiddenLine xmlns:a14="http://schemas.microsoft.com/office/drawing/2010/main" xmlns="" w="9525">
                   <a:solidFill>
                     <a:srgbClr val="000000"/>
                   </a:solidFill>
@@ -2659,7 +2659,7 @@
             </a:ln>
             <a:extLst>
               <a:ext uri="{91240B29-F687-4f45-9708-019B960494DF}">
-                <a14:hiddenLine xmlns="" xmlns:a14="http://schemas.microsoft.com/office/drawing/2010/main" w="9525">
+                <a14:hiddenLine xmlns:a14="http://schemas.microsoft.com/office/drawing/2010/main" xmlns="" w="9525">
                   <a:solidFill>
                     <a:srgbClr val="000000"/>
                   </a:solidFill>
@@ -2727,7 +2727,7 @@
             </a:ln>
             <a:extLst>
               <a:ext uri="{91240B29-F687-4f45-9708-019B960494DF}">
-                <a14:hiddenLine xmlns="" xmlns:a14="http://schemas.microsoft.com/office/drawing/2010/main" w="9525">
+                <a14:hiddenLine xmlns:a14="http://schemas.microsoft.com/office/drawing/2010/main" xmlns="" w="9525">
                   <a:solidFill>
                     <a:srgbClr val="000000"/>
                   </a:solidFill>
@@ -2789,7 +2789,7 @@
             </a:ln>
             <a:extLst>
               <a:ext uri="{91240B29-F687-4f45-9708-019B960494DF}">
-                <a14:hiddenLine xmlns="" xmlns:a14="http://schemas.microsoft.com/office/drawing/2010/main" w="9525">
+                <a14:hiddenLine xmlns:a14="http://schemas.microsoft.com/office/drawing/2010/main" xmlns="" w="9525">
                   <a:solidFill>
                     <a:srgbClr val="000000"/>
                   </a:solidFill>
@@ -2879,7 +2879,7 @@
             </a:ln>
             <a:extLst>
               <a:ext uri="{91240B29-F687-4f45-9708-019B960494DF}">
-                <a14:hiddenLine xmlns="" xmlns:a14="http://schemas.microsoft.com/office/drawing/2010/main" w="9525">
+                <a14:hiddenLine xmlns:a14="http://schemas.microsoft.com/office/drawing/2010/main" xmlns="" w="9525">
                   <a:solidFill>
                     <a:srgbClr val="000000"/>
                   </a:solidFill>
@@ -2941,7 +2941,7 @@
             </a:ln>
             <a:extLst>
               <a:ext uri="{91240B29-F687-4f45-9708-019B960494DF}">
-                <a14:hiddenLine xmlns="" xmlns:a14="http://schemas.microsoft.com/office/drawing/2010/main" w="9525">
+                <a14:hiddenLine xmlns:a14="http://schemas.microsoft.com/office/drawing/2010/main" xmlns="" w="9525">
                   <a:solidFill>
                     <a:srgbClr val="000000"/>
                   </a:solidFill>
@@ -3031,7 +3031,7 @@
             </a:ln>
             <a:extLst>
               <a:ext uri="{91240B29-F687-4f45-9708-019B960494DF}">
-                <a14:hiddenLine xmlns="" xmlns:a14="http://schemas.microsoft.com/office/drawing/2010/main" w="9525">
+                <a14:hiddenLine xmlns:a14="http://schemas.microsoft.com/office/drawing/2010/main" xmlns="" w="9525">
                   <a:solidFill>
                     <a:srgbClr val="000000"/>
                   </a:solidFill>
@@ -3093,7 +3093,7 @@
             </a:ln>
             <a:extLst>
               <a:ext uri="{91240B29-F687-4f45-9708-019B960494DF}">
-                <a14:hiddenLine xmlns="" xmlns:a14="http://schemas.microsoft.com/office/drawing/2010/main" w="9525">
+                <a14:hiddenLine xmlns:a14="http://schemas.microsoft.com/office/drawing/2010/main" xmlns="" w="9525">
                   <a:solidFill>
                     <a:srgbClr val="000000"/>
                   </a:solidFill>
@@ -3183,7 +3183,7 @@
             </a:ln>
             <a:extLst>
               <a:ext uri="{91240B29-F687-4f45-9708-019B960494DF}">
-                <a14:hiddenLine xmlns="" xmlns:a14="http://schemas.microsoft.com/office/drawing/2010/main" w="9525">
+                <a14:hiddenLine xmlns:a14="http://schemas.microsoft.com/office/drawing/2010/main" xmlns="" w="9525">
                   <a:solidFill>
                     <a:srgbClr val="000000"/>
                   </a:solidFill>
@@ -3217,7 +3217,7 @@
             </a:ln>
             <a:extLst>
               <a:ext uri="{91240B29-F687-4f45-9708-019B960494DF}">
-                <a14:hiddenLine xmlns="" xmlns:a14="http://schemas.microsoft.com/office/drawing/2010/main" w="9525">
+                <a14:hiddenLine xmlns:a14="http://schemas.microsoft.com/office/drawing/2010/main" xmlns="" w="9525">
                   <a:solidFill>
                     <a:srgbClr val="000000"/>
                   </a:solidFill>
@@ -3282,7 +3282,7 @@
             </a:ln>
             <a:extLst>
               <a:ext uri="{91240B29-F687-4f45-9708-019B960494DF}">
-                <a14:hiddenLine xmlns="" xmlns:a14="http://schemas.microsoft.com/office/drawing/2010/main" w="9525">
+                <a14:hiddenLine xmlns:a14="http://schemas.microsoft.com/office/drawing/2010/main" xmlns="" w="9525">
                   <a:solidFill>
                     <a:srgbClr val="000000"/>
                   </a:solidFill>
@@ -3372,7 +3372,7 @@
             </a:ln>
             <a:extLst>
               <a:ext uri="{91240B29-F687-4f45-9708-019B960494DF}">
-                <a14:hiddenLine xmlns="" xmlns:a14="http://schemas.microsoft.com/office/drawing/2010/main" w="9525">
+                <a14:hiddenLine xmlns:a14="http://schemas.microsoft.com/office/drawing/2010/main" xmlns="" w="9525">
                   <a:solidFill>
                     <a:srgbClr val="000000"/>
                   </a:solidFill>
@@ -3434,7 +3434,7 @@
             </a:ln>
             <a:extLst>
               <a:ext uri="{91240B29-F687-4f45-9708-019B960494DF}">
-                <a14:hiddenLine xmlns="" xmlns:a14="http://schemas.microsoft.com/office/drawing/2010/main" w="9525">
+                <a14:hiddenLine xmlns:a14="http://schemas.microsoft.com/office/drawing/2010/main" xmlns="" w="9525">
                   <a:solidFill>
                     <a:srgbClr val="000000"/>
                   </a:solidFill>
@@ -3524,7 +3524,7 @@
             </a:ln>
             <a:extLst>
               <a:ext uri="{91240B29-F687-4f45-9708-019B960494DF}">
-                <a14:hiddenLine xmlns="" xmlns:a14="http://schemas.microsoft.com/office/drawing/2010/main" w="9525">
+                <a14:hiddenLine xmlns:a14="http://schemas.microsoft.com/office/drawing/2010/main" xmlns="" w="9525">
                   <a:solidFill>
                     <a:srgbClr val="000000"/>
                   </a:solidFill>
@@ -3614,7 +3614,7 @@
             </a:ln>
             <a:extLst>
               <a:ext uri="{91240B29-F687-4f45-9708-019B960494DF}">
-                <a14:hiddenLine xmlns="" xmlns:a14="http://schemas.microsoft.com/office/drawing/2010/main" w="9525">
+                <a14:hiddenLine xmlns:a14="http://schemas.microsoft.com/office/drawing/2010/main" xmlns="" w="9525">
                   <a:solidFill>
                     <a:srgbClr val="000000"/>
                   </a:solidFill>
@@ -3679,7 +3679,7 @@
             </a:ln>
             <a:extLst>
               <a:ext uri="{91240B29-F687-4f45-9708-019B960494DF}">
-                <a14:hiddenLine xmlns="" xmlns:a14="http://schemas.microsoft.com/office/drawing/2010/main" w="9525">
+                <a14:hiddenLine xmlns:a14="http://schemas.microsoft.com/office/drawing/2010/main" xmlns="" w="9525">
                   <a:solidFill>
                     <a:srgbClr val="000000"/>
                   </a:solidFill>
@@ -3741,7 +3741,7 @@
             </a:ln>
             <a:extLst>
               <a:ext uri="{91240B29-F687-4f45-9708-019B960494DF}">
-                <a14:hiddenLine xmlns="" xmlns:a14="http://schemas.microsoft.com/office/drawing/2010/main" w="9525">
+                <a14:hiddenLine xmlns:a14="http://schemas.microsoft.com/office/drawing/2010/main" xmlns="" w="9525">
                   <a:solidFill>
                     <a:srgbClr val="000000"/>
                   </a:solidFill>
@@ -3831,7 +3831,7 @@
             </a:ln>
             <a:extLst>
               <a:ext uri="{91240B29-F687-4f45-9708-019B960494DF}">
-                <a14:hiddenLine xmlns="" xmlns:a14="http://schemas.microsoft.com/office/drawing/2010/main" w="9525">
+                <a14:hiddenLine xmlns:a14="http://schemas.microsoft.com/office/drawing/2010/main" xmlns="" w="9525">
                   <a:solidFill>
                     <a:srgbClr val="000000"/>
                   </a:solidFill>
@@ -3921,7 +3921,7 @@
             </a:ln>
             <a:extLst>
               <a:ext uri="{91240B29-F687-4f45-9708-019B960494DF}">
-                <a14:hiddenLine xmlns="" xmlns:a14="http://schemas.microsoft.com/office/drawing/2010/main" w="9525">
+                <a14:hiddenLine xmlns:a14="http://schemas.microsoft.com/office/drawing/2010/main" xmlns="" w="9525">
                   <a:solidFill>
                     <a:srgbClr val="000000"/>
                   </a:solidFill>
@@ -3983,7 +3983,7 @@
             </a:ln>
             <a:extLst>
               <a:ext uri="{91240B29-F687-4f45-9708-019B960494DF}">
-                <a14:hiddenLine xmlns="" xmlns:a14="http://schemas.microsoft.com/office/drawing/2010/main" w="9525">
+                <a14:hiddenLine xmlns:a14="http://schemas.microsoft.com/office/drawing/2010/main" xmlns="" w="9525">
                   <a:solidFill>
                     <a:srgbClr val="000000"/>
                   </a:solidFill>
@@ -4103,7 +4103,7 @@
             </a:ln>
             <a:extLst>
               <a:ext uri="{91240B29-F687-4f45-9708-019B960494DF}">
-                <a14:hiddenLine xmlns="" xmlns:a14="http://schemas.microsoft.com/office/drawing/2010/main" w="9525">
+                <a14:hiddenLine xmlns:a14="http://schemas.microsoft.com/office/drawing/2010/main" xmlns="" w="9525">
                   <a:solidFill>
                     <a:srgbClr val="000000"/>
                   </a:solidFill>
@@ -4171,7 +4171,7 @@
             </a:ln>
             <a:extLst>
               <a:ext uri="{91240B29-F687-4f45-9708-019B960494DF}">
-                <a14:hiddenLine xmlns="" xmlns:a14="http://schemas.microsoft.com/office/drawing/2010/main" w="9525">
+                <a14:hiddenLine xmlns:a14="http://schemas.microsoft.com/office/drawing/2010/main" xmlns="" w="9525">
                   <a:solidFill>
                     <a:srgbClr val="000000"/>
                   </a:solidFill>
@@ -4261,7 +4261,7 @@
             </a:ln>
             <a:extLst>
               <a:ext uri="{91240B29-F687-4f45-9708-019B960494DF}">
-                <a14:hiddenLine xmlns="" xmlns:a14="http://schemas.microsoft.com/office/drawing/2010/main" w="9525">
+                <a14:hiddenLine xmlns:a14="http://schemas.microsoft.com/office/drawing/2010/main" xmlns="" w="9525">
                   <a:solidFill>
                     <a:srgbClr val="000000"/>
                   </a:solidFill>
@@ -4401,7 +4401,7 @@
           <a:p>
             <a:fld id="{4774B042-A123-46B9-9E90-9F768F41317F}" type="datetimeFigureOut">
               <a:rPr lang="en-US" smtClean="0"/>
-              <a:t>12/13/2017</a:t>
+              <a:t>12/20/2017</a:t>
             </a:fld>
             <a:endParaRPr lang="en-US"/>
           </a:p>
@@ -4668,7 +4668,7 @@
           <a:p>
             <a:fld id="{4774B042-A123-46B9-9E90-9F768F41317F}" type="datetimeFigureOut">
               <a:rPr lang="en-US" smtClean="0"/>
-              <a:t>12/13/2017</a:t>
+              <a:t>12/20/2017</a:t>
             </a:fld>
             <a:endParaRPr lang="en-US"/>
           </a:p>
@@ -4864,7 +4864,7 @@
           <a:p>
             <a:fld id="{4774B042-A123-46B9-9E90-9F768F41317F}" type="datetimeFigureOut">
               <a:rPr lang="en-US" smtClean="0"/>
-              <a:t>12/13/2017</a:t>
+              <a:t>12/20/2017</a:t>
             </a:fld>
             <a:endParaRPr lang="en-US"/>
           </a:p>
@@ -5127,7 +5127,7 @@
           <a:p>
             <a:fld id="{4774B042-A123-46B9-9E90-9F768F41317F}" type="datetimeFigureOut">
               <a:rPr lang="en-US" smtClean="0"/>
-              <a:t>12/13/2017</a:t>
+              <a:t>12/20/2017</a:t>
             </a:fld>
             <a:endParaRPr lang="en-US"/>
           </a:p>
@@ -5561,7 +5561,7 @@
           <a:p>
             <a:fld id="{4774B042-A123-46B9-9E90-9F768F41317F}" type="datetimeFigureOut">
               <a:rPr lang="en-US" smtClean="0"/>
-              <a:t>12/13/2017</a:t>
+              <a:t>12/20/2017</a:t>
             </a:fld>
             <a:endParaRPr lang="en-US"/>
           </a:p>
@@ -6107,7 +6107,7 @@
           <a:p>
             <a:fld id="{4774B042-A123-46B9-9E90-9F768F41317F}" type="datetimeFigureOut">
               <a:rPr lang="en-US" smtClean="0"/>
-              <a:t>12/13/2017</a:t>
+              <a:t>12/20/2017</a:t>
             </a:fld>
             <a:endParaRPr lang="en-US"/>
           </a:p>
@@ -6827,7 +6827,7 @@
           <a:p>
             <a:fld id="{4774B042-A123-46B9-9E90-9F768F41317F}" type="datetimeFigureOut">
               <a:rPr lang="en-US" smtClean="0"/>
-              <a:t>12/13/2017</a:t>
+              <a:t>12/20/2017</a:t>
             </a:fld>
             <a:endParaRPr lang="en-US"/>
           </a:p>
@@ -6997,7 +6997,7 @@
           <a:p>
             <a:fld id="{4774B042-A123-46B9-9E90-9F768F41317F}" type="datetimeFigureOut">
               <a:rPr lang="en-US" smtClean="0"/>
-              <a:t>12/13/2017</a:t>
+              <a:t>12/20/2017</a:t>
             </a:fld>
             <a:endParaRPr lang="en-US"/>
           </a:p>
@@ -7177,7 +7177,7 @@
           <a:p>
             <a:fld id="{4774B042-A123-46B9-9E90-9F768F41317F}" type="datetimeFigureOut">
               <a:rPr lang="en-US" smtClean="0"/>
-              <a:t>12/13/2017</a:t>
+              <a:t>12/20/2017</a:t>
             </a:fld>
             <a:endParaRPr lang="en-US"/>
           </a:p>
@@ -7347,7 +7347,7 @@
           <a:p>
             <a:fld id="{4774B042-A123-46B9-9E90-9F768F41317F}" type="datetimeFigureOut">
               <a:rPr lang="en-US" smtClean="0"/>
-              <a:t>12/13/2017</a:t>
+              <a:t>12/20/2017</a:t>
             </a:fld>
             <a:endParaRPr lang="en-US"/>
           </a:p>
@@ -7597,7 +7597,7 @@
           <a:p>
             <a:fld id="{4774B042-A123-46B9-9E90-9F768F41317F}" type="datetimeFigureOut">
               <a:rPr lang="en-US" smtClean="0"/>
-              <a:t>12/13/2017</a:t>
+              <a:t>12/20/2017</a:t>
             </a:fld>
             <a:endParaRPr lang="en-US"/>
           </a:p>
@@ -7829,7 +7829,7 @@
           <a:p>
             <a:fld id="{4774B042-A123-46B9-9E90-9F768F41317F}" type="datetimeFigureOut">
               <a:rPr lang="en-US" smtClean="0"/>
-              <a:t>12/13/2017</a:t>
+              <a:t>12/20/2017</a:t>
             </a:fld>
             <a:endParaRPr lang="en-US"/>
           </a:p>
@@ -8210,7 +8210,7 @@
           <a:p>
             <a:fld id="{4774B042-A123-46B9-9E90-9F768F41317F}" type="datetimeFigureOut">
               <a:rPr lang="en-US" smtClean="0"/>
-              <a:t>12/13/2017</a:t>
+              <a:t>12/20/2017</a:t>
             </a:fld>
             <a:endParaRPr lang="en-US"/>
           </a:p>
@@ -8328,7 +8328,7 @@
           <a:p>
             <a:fld id="{4774B042-A123-46B9-9E90-9F768F41317F}" type="datetimeFigureOut">
               <a:rPr lang="en-US" smtClean="0"/>
-              <a:t>12/13/2017</a:t>
+              <a:t>12/20/2017</a:t>
             </a:fld>
             <a:endParaRPr lang="en-US"/>
           </a:p>
@@ -8423,7 +8423,7 @@
           <a:p>
             <a:fld id="{4774B042-A123-46B9-9E90-9F768F41317F}" type="datetimeFigureOut">
               <a:rPr lang="en-US" smtClean="0"/>
-              <a:t>12/13/2017</a:t>
+              <a:t>12/20/2017</a:t>
             </a:fld>
             <a:endParaRPr lang="en-US"/>
           </a:p>
@@ -8672,7 +8672,7 @@
           <a:p>
             <a:fld id="{4774B042-A123-46B9-9E90-9F768F41317F}" type="datetimeFigureOut">
               <a:rPr lang="en-US" smtClean="0"/>
-              <a:t>12/13/2017</a:t>
+              <a:t>12/20/2017</a:t>
             </a:fld>
             <a:endParaRPr lang="en-US"/>
           </a:p>
@@ -8952,7 +8952,7 @@
           <a:p>
             <a:fld id="{4774B042-A123-46B9-9E90-9F768F41317F}" type="datetimeFigureOut">
               <a:rPr lang="en-US" smtClean="0"/>
-              <a:t>12/13/2017</a:t>
+              <a:t>12/20/2017</a:t>
             </a:fld>
             <a:endParaRPr lang="en-US"/>
           </a:p>
@@ -9068,7 +9068,7 @@
           <a:noFill/>
           <a:extLst>
             <a:ext uri="{909E8E84-426E-40dd-AFC4-6F175D3DCCD1}">
-              <a14:hiddenFill xmlns="" xmlns:a14="http://schemas.microsoft.com/office/drawing/2010/main">
+              <a14:hiddenFill xmlns:a14="http://schemas.microsoft.com/office/drawing/2010/main" xmlns="">
                 <a:solidFill>
                   <a:srgbClr val="FFFFFF"/>
                 </a:solidFill>
@@ -9142,7 +9142,7 @@
               </a:ln>
               <a:extLst>
                 <a:ext uri="{91240B29-F687-4f45-9708-019B960494DF}">
-                  <a14:hiddenLine xmlns="" xmlns:a14="http://schemas.microsoft.com/office/drawing/2010/main" w="9525">
+                  <a14:hiddenLine xmlns:a14="http://schemas.microsoft.com/office/drawing/2010/main" xmlns="" w="9525">
                     <a:solidFill>
                       <a:srgbClr val="000000"/>
                     </a:solidFill>
@@ -9232,7 +9232,7 @@
               </a:ln>
               <a:extLst>
                 <a:ext uri="{91240B29-F687-4f45-9708-019B960494DF}">
-                  <a14:hiddenLine xmlns="" xmlns:a14="http://schemas.microsoft.com/office/drawing/2010/main" w="9525">
+                  <a14:hiddenLine xmlns:a14="http://schemas.microsoft.com/office/drawing/2010/main" xmlns="" w="9525">
                     <a:solidFill>
                       <a:srgbClr val="000000"/>
                     </a:solidFill>
@@ -9322,7 +9322,7 @@
               </a:ln>
               <a:extLst>
                 <a:ext uri="{91240B29-F687-4f45-9708-019B960494DF}">
-                  <a14:hiddenLine xmlns="" xmlns:a14="http://schemas.microsoft.com/office/drawing/2010/main" w="9525">
+                  <a14:hiddenLine xmlns:a14="http://schemas.microsoft.com/office/drawing/2010/main" xmlns="" w="9525">
                     <a:solidFill>
                       <a:srgbClr val="000000"/>
                     </a:solidFill>
@@ -9384,7 +9384,7 @@
               </a:ln>
               <a:extLst>
                 <a:ext uri="{91240B29-F687-4f45-9708-019B960494DF}">
-                  <a14:hiddenLine xmlns="" xmlns:a14="http://schemas.microsoft.com/office/drawing/2010/main" w="9525">
+                  <a14:hiddenLine xmlns:a14="http://schemas.microsoft.com/office/drawing/2010/main" xmlns="" w="9525">
                     <a:solidFill>
                       <a:srgbClr val="000000"/>
                     </a:solidFill>
@@ -9474,7 +9474,7 @@
               </a:ln>
               <a:extLst>
                 <a:ext uri="{91240B29-F687-4f45-9708-019B960494DF}">
-                  <a14:hiddenLine xmlns="" xmlns:a14="http://schemas.microsoft.com/office/drawing/2010/main" w="9525">
+                  <a14:hiddenLine xmlns:a14="http://schemas.microsoft.com/office/drawing/2010/main" xmlns="" w="9525">
                     <a:solidFill>
                       <a:srgbClr val="000000"/>
                     </a:solidFill>
@@ -9536,7 +9536,7 @@
               </a:ln>
               <a:extLst>
                 <a:ext uri="{91240B29-F687-4f45-9708-019B960494DF}">
-                  <a14:hiddenLine xmlns="" xmlns:a14="http://schemas.microsoft.com/office/drawing/2010/main" w="9525">
+                  <a14:hiddenLine xmlns:a14="http://schemas.microsoft.com/office/drawing/2010/main" xmlns="" w="9525">
                     <a:solidFill>
                       <a:srgbClr val="000000"/>
                     </a:solidFill>
@@ -9598,7 +9598,7 @@
               </a:ln>
               <a:extLst>
                 <a:ext uri="{91240B29-F687-4f45-9708-019B960494DF}">
-                  <a14:hiddenLine xmlns="" xmlns:a14="http://schemas.microsoft.com/office/drawing/2010/main" w="9525">
+                  <a14:hiddenLine xmlns:a14="http://schemas.microsoft.com/office/drawing/2010/main" xmlns="" w="9525">
                     <a:solidFill>
                       <a:srgbClr val="000000"/>
                     </a:solidFill>
@@ -9688,7 +9688,7 @@
               </a:ln>
               <a:extLst>
                 <a:ext uri="{91240B29-F687-4f45-9708-019B960494DF}">
-                  <a14:hiddenLine xmlns="" xmlns:a14="http://schemas.microsoft.com/office/drawing/2010/main" w="9525">
+                  <a14:hiddenLine xmlns:a14="http://schemas.microsoft.com/office/drawing/2010/main" xmlns="" w="9525">
                     <a:solidFill>
                       <a:srgbClr val="000000"/>
                     </a:solidFill>
@@ -9778,7 +9778,7 @@
               </a:ln>
               <a:extLst>
                 <a:ext uri="{91240B29-F687-4f45-9708-019B960494DF}">
-                  <a14:hiddenLine xmlns="" xmlns:a14="http://schemas.microsoft.com/office/drawing/2010/main" w="9525">
+                  <a14:hiddenLine xmlns:a14="http://schemas.microsoft.com/office/drawing/2010/main" xmlns="" w="9525">
                     <a:solidFill>
                       <a:srgbClr val="000000"/>
                     </a:solidFill>
@@ -9840,7 +9840,7 @@
               </a:ln>
               <a:extLst>
                 <a:ext uri="{91240B29-F687-4f45-9708-019B960494DF}">
-                  <a14:hiddenLine xmlns="" xmlns:a14="http://schemas.microsoft.com/office/drawing/2010/main" w="9525">
+                  <a14:hiddenLine xmlns:a14="http://schemas.microsoft.com/office/drawing/2010/main" xmlns="" w="9525">
                     <a:solidFill>
                       <a:srgbClr val="000000"/>
                     </a:solidFill>
@@ -9950,7 +9950,7 @@
               </a:ln>
               <a:extLst>
                 <a:ext uri="{91240B29-F687-4f45-9708-019B960494DF}">
-                  <a14:hiddenLine xmlns="" xmlns:a14="http://schemas.microsoft.com/office/drawing/2010/main" w="9525">
+                  <a14:hiddenLine xmlns:a14="http://schemas.microsoft.com/office/drawing/2010/main" xmlns="" w="9525">
                     <a:solidFill>
                       <a:srgbClr val="000000"/>
                     </a:solidFill>
@@ -10034,7 +10034,7 @@
               </a:ln>
               <a:extLst>
                 <a:ext uri="{91240B29-F687-4f45-9708-019B960494DF}">
-                  <a14:hiddenLine xmlns="" xmlns:a14="http://schemas.microsoft.com/office/drawing/2010/main" w="9525">
+                  <a14:hiddenLine xmlns:a14="http://schemas.microsoft.com/office/drawing/2010/main" xmlns="" w="9525">
                     <a:solidFill>
                       <a:srgbClr val="000000"/>
                     </a:solidFill>
@@ -10096,7 +10096,7 @@
               </a:ln>
               <a:extLst>
                 <a:ext uri="{91240B29-F687-4f45-9708-019B960494DF}">
-                  <a14:hiddenLine xmlns="" xmlns:a14="http://schemas.microsoft.com/office/drawing/2010/main" w="9525">
+                  <a14:hiddenLine xmlns:a14="http://schemas.microsoft.com/office/drawing/2010/main" xmlns="" w="9525">
                     <a:solidFill>
                       <a:srgbClr val="000000"/>
                     </a:solidFill>
@@ -10158,7 +10158,7 @@
               </a:ln>
               <a:extLst>
                 <a:ext uri="{91240B29-F687-4f45-9708-019B960494DF}">
-                  <a14:hiddenLine xmlns="" xmlns:a14="http://schemas.microsoft.com/office/drawing/2010/main" w="9525">
+                  <a14:hiddenLine xmlns:a14="http://schemas.microsoft.com/office/drawing/2010/main" xmlns="" w="9525">
                     <a:solidFill>
                       <a:srgbClr val="000000"/>
                     </a:solidFill>
@@ -10248,7 +10248,7 @@
               </a:ln>
               <a:extLst>
                 <a:ext uri="{91240B29-F687-4f45-9708-019B960494DF}">
-                  <a14:hiddenLine xmlns="" xmlns:a14="http://schemas.microsoft.com/office/drawing/2010/main" w="9525">
+                  <a14:hiddenLine xmlns:a14="http://schemas.microsoft.com/office/drawing/2010/main" xmlns="" w="9525">
                     <a:solidFill>
                       <a:srgbClr val="000000"/>
                     </a:solidFill>
@@ -10282,7 +10282,7 @@
               </a:ln>
               <a:extLst>
                 <a:ext uri="{91240B29-F687-4f45-9708-019B960494DF}">
-                  <a14:hiddenLine xmlns="" xmlns:a14="http://schemas.microsoft.com/office/drawing/2010/main" w="9525">
+                  <a14:hiddenLine xmlns:a14="http://schemas.microsoft.com/office/drawing/2010/main" xmlns="" w="9525">
                     <a:solidFill>
                       <a:srgbClr val="000000"/>
                     </a:solidFill>
@@ -10347,7 +10347,7 @@
               </a:ln>
               <a:extLst>
                 <a:ext uri="{91240B29-F687-4f45-9708-019B960494DF}">
-                  <a14:hiddenLine xmlns="" xmlns:a14="http://schemas.microsoft.com/office/drawing/2010/main" w="9525">
+                  <a14:hiddenLine xmlns:a14="http://schemas.microsoft.com/office/drawing/2010/main" xmlns="" w="9525">
                     <a:solidFill>
                       <a:srgbClr val="000000"/>
                     </a:solidFill>
@@ -10437,7 +10437,7 @@
               </a:ln>
               <a:extLst>
                 <a:ext uri="{91240B29-F687-4f45-9708-019B960494DF}">
-                  <a14:hiddenLine xmlns="" xmlns:a14="http://schemas.microsoft.com/office/drawing/2010/main" w="9525">
+                  <a14:hiddenLine xmlns:a14="http://schemas.microsoft.com/office/drawing/2010/main" xmlns="" w="9525">
                     <a:solidFill>
                       <a:srgbClr val="000000"/>
                     </a:solidFill>
@@ -10499,7 +10499,7 @@
               </a:ln>
               <a:extLst>
                 <a:ext uri="{91240B29-F687-4f45-9708-019B960494DF}">
-                  <a14:hiddenLine xmlns="" xmlns:a14="http://schemas.microsoft.com/office/drawing/2010/main" w="9525">
+                  <a14:hiddenLine xmlns:a14="http://schemas.microsoft.com/office/drawing/2010/main" xmlns="" w="9525">
                     <a:solidFill>
                       <a:srgbClr val="000000"/>
                     </a:solidFill>
@@ -10589,7 +10589,7 @@
               </a:ln>
               <a:extLst>
                 <a:ext uri="{91240B29-F687-4f45-9708-019B960494DF}">
-                  <a14:hiddenLine xmlns="" xmlns:a14="http://schemas.microsoft.com/office/drawing/2010/main" w="9525">
+                  <a14:hiddenLine xmlns:a14="http://schemas.microsoft.com/office/drawing/2010/main" xmlns="" w="9525">
                     <a:solidFill>
                       <a:srgbClr val="000000"/>
                     </a:solidFill>
@@ -10654,7 +10654,7 @@
               </a:ln>
               <a:extLst>
                 <a:ext uri="{91240B29-F687-4f45-9708-019B960494DF}">
-                  <a14:hiddenLine xmlns="" xmlns:a14="http://schemas.microsoft.com/office/drawing/2010/main" w="9525">
+                  <a14:hiddenLine xmlns:a14="http://schemas.microsoft.com/office/drawing/2010/main" xmlns="" w="9525">
                     <a:solidFill>
                       <a:srgbClr val="000000"/>
                     </a:solidFill>
@@ -10716,7 +10716,7 @@
               </a:ln>
               <a:extLst>
                 <a:ext uri="{91240B29-F687-4f45-9708-019B960494DF}">
-                  <a14:hiddenLine xmlns="" xmlns:a14="http://schemas.microsoft.com/office/drawing/2010/main" w="9525">
+                  <a14:hiddenLine xmlns:a14="http://schemas.microsoft.com/office/drawing/2010/main" xmlns="" w="9525">
                     <a:solidFill>
                       <a:srgbClr val="000000"/>
                     </a:solidFill>
@@ -10806,7 +10806,7 @@
               </a:ln>
               <a:extLst>
                 <a:ext uri="{91240B29-F687-4f45-9708-019B960494DF}">
-                  <a14:hiddenLine xmlns="" xmlns:a14="http://schemas.microsoft.com/office/drawing/2010/main" w="9525">
+                  <a14:hiddenLine xmlns:a14="http://schemas.microsoft.com/office/drawing/2010/main" xmlns="" w="9525">
                     <a:solidFill>
                       <a:srgbClr val="000000"/>
                     </a:solidFill>
@@ -10896,7 +10896,7 @@
               </a:ln>
               <a:extLst>
                 <a:ext uri="{91240B29-F687-4f45-9708-019B960494DF}">
-                  <a14:hiddenLine xmlns="" xmlns:a14="http://schemas.microsoft.com/office/drawing/2010/main" w="9525">
+                  <a14:hiddenLine xmlns:a14="http://schemas.microsoft.com/office/drawing/2010/main" xmlns="" w="9525">
                     <a:solidFill>
                       <a:srgbClr val="000000"/>
                     </a:solidFill>
@@ -10961,7 +10961,7 @@
               </a:ln>
               <a:extLst>
                 <a:ext uri="{91240B29-F687-4f45-9708-019B960494DF}">
-                  <a14:hiddenLine xmlns="" xmlns:a14="http://schemas.microsoft.com/office/drawing/2010/main" w="9525">
+                  <a14:hiddenLine xmlns:a14="http://schemas.microsoft.com/office/drawing/2010/main" xmlns="" w="9525">
                     <a:solidFill>
                       <a:srgbClr val="000000"/>
                     </a:solidFill>
@@ -11081,7 +11081,7 @@
               </a:ln>
               <a:extLst>
                 <a:ext uri="{91240B29-F687-4f45-9708-019B960494DF}">
-                  <a14:hiddenLine xmlns="" xmlns:a14="http://schemas.microsoft.com/office/drawing/2010/main" w="9525">
+                  <a14:hiddenLine xmlns:a14="http://schemas.microsoft.com/office/drawing/2010/main" xmlns="" w="9525">
                     <a:solidFill>
                       <a:srgbClr val="000000"/>
                     </a:solidFill>
@@ -11179,7 +11179,7 @@
               </a:ln>
               <a:extLst>
                 <a:ext uri="{91240B29-F687-4f45-9708-019B960494DF}">
-                  <a14:hiddenLine xmlns="" xmlns:a14="http://schemas.microsoft.com/office/drawing/2010/main" w="9525">
+                  <a14:hiddenLine xmlns:a14="http://schemas.microsoft.com/office/drawing/2010/main" xmlns="" w="9525">
                     <a:solidFill>
                       <a:srgbClr val="000000"/>
                     </a:solidFill>
@@ -11294,7 +11294,7 @@
               </a:ln>
               <a:extLst>
                 <a:ext uri="{91240B29-F687-4f45-9708-019B960494DF}">
-                  <a14:hiddenLine xmlns="" xmlns:a14="http://schemas.microsoft.com/office/drawing/2010/main" w="9525">
+                  <a14:hiddenLine xmlns:a14="http://schemas.microsoft.com/office/drawing/2010/main" xmlns="" w="9525">
                     <a:solidFill>
                       <a:srgbClr val="000000"/>
                     </a:solidFill>
@@ -11384,7 +11384,7 @@
               </a:ln>
               <a:extLst>
                 <a:ext uri="{91240B29-F687-4f45-9708-019B960494DF}">
-                  <a14:hiddenLine xmlns="" xmlns:a14="http://schemas.microsoft.com/office/drawing/2010/main" w="9525">
+                  <a14:hiddenLine xmlns:a14="http://schemas.microsoft.com/office/drawing/2010/main" xmlns="" w="9525">
                     <a:solidFill>
                       <a:srgbClr val="000000"/>
                     </a:solidFill>
@@ -11449,7 +11449,7 @@
               </a:ln>
               <a:extLst>
                 <a:ext uri="{91240B29-F687-4f45-9708-019B960494DF}">
-                  <a14:hiddenLine xmlns="" xmlns:a14="http://schemas.microsoft.com/office/drawing/2010/main" w="9525">
+                  <a14:hiddenLine xmlns:a14="http://schemas.microsoft.com/office/drawing/2010/main" xmlns="" w="9525">
                     <a:solidFill>
                       <a:srgbClr val="000000"/>
                     </a:solidFill>
@@ -11539,7 +11539,7 @@
               </a:ln>
               <a:extLst>
                 <a:ext uri="{91240B29-F687-4f45-9708-019B960494DF}">
-                  <a14:hiddenLine xmlns="" xmlns:a14="http://schemas.microsoft.com/office/drawing/2010/main" w="9525">
+                  <a14:hiddenLine xmlns:a14="http://schemas.microsoft.com/office/drawing/2010/main" xmlns="" w="9525">
                     <a:solidFill>
                       <a:srgbClr val="000000"/>
                     </a:solidFill>
@@ -11607,7 +11607,7 @@
               </a:ln>
               <a:extLst>
                 <a:ext uri="{91240B29-F687-4f45-9708-019B960494DF}">
-                  <a14:hiddenLine xmlns="" xmlns:a14="http://schemas.microsoft.com/office/drawing/2010/main" w="9525">
+                  <a14:hiddenLine xmlns:a14="http://schemas.microsoft.com/office/drawing/2010/main" xmlns="" w="9525">
                     <a:solidFill>
                       <a:srgbClr val="000000"/>
                     </a:solidFill>
@@ -11697,7 +11697,7 @@
               </a:ln>
               <a:extLst>
                 <a:ext uri="{91240B29-F687-4f45-9708-019B960494DF}">
-                  <a14:hiddenLine xmlns="" xmlns:a14="http://schemas.microsoft.com/office/drawing/2010/main" w="9525">
+                  <a14:hiddenLine xmlns:a14="http://schemas.microsoft.com/office/drawing/2010/main" xmlns="" w="9525">
                     <a:solidFill>
                       <a:srgbClr val="000000"/>
                     </a:solidFill>
@@ -11765,7 +11765,7 @@
               </a:ln>
               <a:extLst>
                 <a:ext uri="{91240B29-F687-4f45-9708-019B960494DF}">
-                  <a14:hiddenLine xmlns="" xmlns:a14="http://schemas.microsoft.com/office/drawing/2010/main" w="9525">
+                  <a14:hiddenLine xmlns:a14="http://schemas.microsoft.com/office/drawing/2010/main" xmlns="" w="9525">
                     <a:solidFill>
                       <a:srgbClr val="000000"/>
                     </a:solidFill>
@@ -11855,7 +11855,7 @@
               </a:ln>
               <a:extLst>
                 <a:ext uri="{91240B29-F687-4f45-9708-019B960494DF}">
-                  <a14:hiddenLine xmlns="" xmlns:a14="http://schemas.microsoft.com/office/drawing/2010/main" w="9525">
+                  <a14:hiddenLine xmlns:a14="http://schemas.microsoft.com/office/drawing/2010/main" xmlns="" w="9525">
                     <a:solidFill>
                       <a:srgbClr val="000000"/>
                     </a:solidFill>
@@ -11889,7 +11889,7 @@
               </a:ln>
               <a:extLst>
                 <a:ext uri="{91240B29-F687-4f45-9708-019B960494DF}">
-                  <a14:hiddenLine xmlns="" xmlns:a14="http://schemas.microsoft.com/office/drawing/2010/main" w="9525">
+                  <a14:hiddenLine xmlns:a14="http://schemas.microsoft.com/office/drawing/2010/main" xmlns="" w="9525">
                     <a:solidFill>
                       <a:srgbClr val="000000"/>
                     </a:solidFill>
@@ -12029,7 +12029,7 @@
           <a:p>
             <a:fld id="{4774B042-A123-46B9-9E90-9F768F41317F}" type="datetimeFigureOut">
               <a:rPr lang="en-US" smtClean="0"/>
-              <a:t>12/13/2017</a:t>
+              <a:t>12/20/2017</a:t>
             </a:fld>
             <a:endParaRPr lang="en-US"/>
           </a:p>
@@ -12473,17 +12473,18 @@
           <a:p>
             <a:pPr algn="ctr"/>
             <a:r>
+              <a:rPr lang="en-US" dirty="0" err="1"/>
+              <a:t>MetaHeuristic</a:t>
+            </a:r>
+            <a:r>
               <a:rPr lang="en-US" dirty="0"/>
-              <a:t>Using Genetic Algorithm as </a:t>
+              <a:t> framework Using a </a:t>
             </a:r>
             <a:r>
               <a:rPr lang="en-US"/>
-              <a:t>a meta heuristic </a:t>
+              <a:t>Genetic Algorithm</a:t>
             </a:r>
-            <a:r>
-              <a:rPr lang="en-US" dirty="0"/>
-              <a:t>for search algorithms</a:t>
-            </a:r>
+            <a:endParaRPr lang="en-US" dirty="0"/>
           </a:p>
         </p:txBody>
       </p:sp>
@@ -12707,13 +12708,7 @@
           <a:p>
             <a:r>
               <a:rPr lang="en-US" dirty="0"/>
-              <a:t>Again, we utilized a genetic algorithm as a meta heuristic for search algorithms applied to a 2D graph. </a:t>
-            </a:r>
-          </a:p>
-          <a:p>
-            <a:r>
-              <a:rPr lang="en-US" dirty="0"/>
-              <a:t>Our genetic algorithm consisted of 50 generations with a population of 10 individuals that have 6 traits (for six search algorithms in alphabetical order).</a:t>
+              <a:t>Designed a framework, utilizing an automated maze solver, an algorithm scorer, and a genetic algorithm, as a meta heuristic for search algorithms applied to a 2D maze.</a:t>
             </a:r>
           </a:p>
           <a:p>
@@ -12802,25 +12797,13 @@
           <a:p>
             <a:r>
               <a:rPr lang="en-US" dirty="0"/>
-              <a:t>Beam</a:t>
+              <a:t>BFS</a:t>
             </a:r>
           </a:p>
           <a:p>
             <a:r>
               <a:rPr lang="en-US" dirty="0"/>
-              <a:t>BFS</a:t>
-            </a:r>
-          </a:p>
-          <a:p>
-            <a:r>
-              <a:rPr lang="en-US" dirty="0"/>
-              <a:t>DFS</a:t>
-            </a:r>
-          </a:p>
-          <a:p>
-            <a:r>
-              <a:rPr lang="en-US" dirty="0"/>
-              <a:t>Hill climbing</a:t>
+              <a:t>Best first</a:t>
             </a:r>
           </a:p>
           <a:p>
@@ -12936,7 +12919,7 @@
             <a:pPr lvl="1"/>
             <a:r>
               <a:rPr lang="en-US" dirty="0"/>
-              <a:t>Space complexity (Max amount of nodes expanded)</a:t>
+              <a:t>Time (Amount of time in milliseconds taken to solve the problem)</a:t>
             </a:r>
           </a:p>
           <a:p>
@@ -13251,17 +13234,19 @@
       </p:grpSpPr>
       <p:pic>
         <p:nvPicPr>
-          <p:cNvPr id="5" name="Picture 4">
+          <p:cNvPr id="5" name="Content Placeholder 4">
             <a:extLst>
               <a:ext uri="{FF2B5EF4-FFF2-40B4-BE49-F238E27FC236}">
-                <a16:creationId xmlns:a16="http://schemas.microsoft.com/office/drawing/2014/main" id="{0FEB80A4-DE6B-4F13-86F1-666CBA8E476E}"/>
+                <a16:creationId xmlns:a16="http://schemas.microsoft.com/office/drawing/2014/main" id="{263AD97C-4CE7-42B2-9C85-F911C55A774E}"/>
               </a:ext>
             </a:extLst>
           </p:cNvPr>
           <p:cNvPicPr>
-            <a:picLocks noChangeAspect="1"/>
+            <a:picLocks noGrp="1" noChangeAspect="1"/>
           </p:cNvPicPr>
-          <p:nvPr/>
+          <p:nvPr>
+            <p:ph idx="1"/>
+          </p:nvPr>
         </p:nvPicPr>
         <p:blipFill>
           <a:blip r:embed="rId2">
@@ -13277,113 +13262,15 @@
         </p:blipFill>
         <p:spPr>
           <a:xfrm>
-            <a:off x="552669" y="0"/>
-            <a:ext cx="10787404" cy="6858000"/>
+            <a:off x="3200400" y="63803"/>
+            <a:ext cx="6045374" cy="6794197"/>
           </a:xfrm>
-          <a:prstGeom prst="rect">
-            <a:avLst/>
-          </a:prstGeom>
         </p:spPr>
       </p:pic>
-      <p:sp>
-        <p:nvSpPr>
-          <p:cNvPr id="2" name="Title 1">
-            <a:extLst>
-              <a:ext uri="{FF2B5EF4-FFF2-40B4-BE49-F238E27FC236}">
-                <a16:creationId xmlns:a16="http://schemas.microsoft.com/office/drawing/2014/main" id="{BA25ABD5-FBDA-4EEE-83DB-D265DBDFEB3B}"/>
-              </a:ext>
-            </a:extLst>
-          </p:cNvPr>
-          <p:cNvSpPr>
-            <a:spLocks noGrp="1"/>
-          </p:cNvSpPr>
-          <p:nvPr>
-            <p:ph type="title"/>
-          </p:nvPr>
-        </p:nvSpPr>
-        <p:spPr>
-          <a:xfrm>
-            <a:off x="5663537" y="926089"/>
-            <a:ext cx="6528463" cy="1478570"/>
-          </a:xfrm>
-        </p:spPr>
-        <p:txBody>
-          <a:bodyPr/>
-          <a:lstStyle/>
-          <a:p>
-            <a:r>
-              <a:rPr lang="en-US" dirty="0"/>
-              <a:t>Implementation of GA</a:t>
-            </a:r>
-          </a:p>
-        </p:txBody>
-      </p:sp>
-      <p:sp>
-        <p:nvSpPr>
-          <p:cNvPr id="3" name="Content Placeholder 2">
-            <a:extLst>
-              <a:ext uri="{FF2B5EF4-FFF2-40B4-BE49-F238E27FC236}">
-                <a16:creationId xmlns:a16="http://schemas.microsoft.com/office/drawing/2014/main" id="{BCA30865-C06F-4F55-88EC-3CD5A6169631}"/>
-              </a:ext>
-            </a:extLst>
-          </p:cNvPr>
-          <p:cNvSpPr>
-            <a:spLocks noGrp="1"/>
-          </p:cNvSpPr>
-          <p:nvPr>
-            <p:ph idx="1"/>
-          </p:nvPr>
-        </p:nvSpPr>
-        <p:spPr>
-          <a:xfrm>
-            <a:off x="6694314" y="1870364"/>
-            <a:ext cx="3854537" cy="4862945"/>
-          </a:xfrm>
-        </p:spPr>
-        <p:txBody>
-          <a:bodyPr>
-            <a:normAutofit fontScale="92500" lnSpcReduction="10000"/>
-          </a:bodyPr>
-          <a:lstStyle/>
-          <a:p>
-            <a:r>
-              <a:rPr lang="en-US" dirty="0"/>
-              <a:t>Singleton class</a:t>
-            </a:r>
-          </a:p>
-          <a:p>
-            <a:r>
-              <a:rPr lang="en-US" dirty="0"/>
-              <a:t>Reminder that an individual is a vector&lt;bool&gt;</a:t>
-            </a:r>
-          </a:p>
-          <a:p>
-            <a:endParaRPr lang="en-US" dirty="0"/>
-          </a:p>
-          <a:p>
-            <a:r>
-              <a:rPr lang="en-US" dirty="0"/>
-              <a:t>A generation is therefore a vector&lt;vector&lt;bool&gt;&gt;</a:t>
-            </a:r>
-          </a:p>
-          <a:p>
-            <a:r>
-              <a:rPr lang="en-US" dirty="0"/>
-              <a:t>Problems are labelled by their filename.</a:t>
-            </a:r>
-          </a:p>
-          <a:p>
-            <a:r>
-              <a:rPr lang="en-US" dirty="0"/>
-              <a:t>This class is really only useful for traits that can be defined as Boolean values.</a:t>
-            </a:r>
-          </a:p>
-        </p:txBody>
-      </p:sp>
     </p:spTree>
     <p:extLst>
       <p:ext uri="{BB962C8B-B14F-4D97-AF65-F5344CB8AC3E}">
-        <p14:creationId xmlns:p14="http://schemas.microsoft.com/office/powerpoint/2010/main" val="3991243543"/>
+        <p14:creationId xmlns:p14="http://schemas.microsoft.com/office/powerpoint/2010/main" val="891959945"/>
       </p:ext>
     </p:extLst>
   </p:cSld>
@@ -13415,7 +13302,7 @@
           <p:cNvPr id="2" name="Title 1">
             <a:extLst>
               <a:ext uri="{FF2B5EF4-FFF2-40B4-BE49-F238E27FC236}">
-                <a16:creationId xmlns:a16="http://schemas.microsoft.com/office/drawing/2014/main" id="{435853A4-E787-42EA-9922-9925B80D3EC1}"/>
+                <a16:creationId xmlns:a16="http://schemas.microsoft.com/office/drawing/2014/main" id="{625861D0-DA18-40D9-B55B-ED9743206225}"/>
               </a:ext>
             </a:extLst>
           </p:cNvPr>
@@ -13426,20 +13313,12 @@
             <p:ph type="title"/>
           </p:nvPr>
         </p:nvSpPr>
-        <p:spPr>
-          <a:xfrm>
-            <a:off x="1114632" y="621185"/>
-            <a:ext cx="9905998" cy="1478570"/>
-          </a:xfrm>
-        </p:spPr>
+        <p:spPr/>
         <p:txBody>
           <a:bodyPr/>
           <a:lstStyle/>
           <a:p>
-            <a:r>
-              <a:rPr lang="en-US" dirty="0"/>
-              <a:t>Usage In Driver</a:t>
-            </a:r>
+            <a:endParaRPr lang="en-US"/>
           </a:p>
         </p:txBody>
       </p:sp>
@@ -13448,7 +13327,7 @@
           <p:cNvPr id="5" name="Content Placeholder 4">
             <a:extLst>
               <a:ext uri="{FF2B5EF4-FFF2-40B4-BE49-F238E27FC236}">
-                <a16:creationId xmlns:a16="http://schemas.microsoft.com/office/drawing/2014/main" id="{4D9F50A8-5BFB-4D9F-B367-EE97EA9A460E}"/>
+                <a16:creationId xmlns:a16="http://schemas.microsoft.com/office/drawing/2014/main" id="{FC4F7CC1-A827-47B0-BAC7-612EC65B0ECA}"/>
               </a:ext>
             </a:extLst>
           </p:cNvPr>
@@ -13473,54 +13352,51 @@
         </p:blipFill>
         <p:spPr>
           <a:xfrm>
-            <a:off x="0" y="2443942"/>
-            <a:ext cx="9386522" cy="4414058"/>
+            <a:off x="-1" y="-1"/>
+            <a:ext cx="5664883" cy="4760913"/>
           </a:xfrm>
         </p:spPr>
       </p:pic>
-      <p:sp>
-        <p:nvSpPr>
-          <p:cNvPr id="7" name="TextBox 6">
+      <p:pic>
+        <p:nvPicPr>
+          <p:cNvPr id="7" name="Picture 6">
             <a:extLst>
               <a:ext uri="{FF2B5EF4-FFF2-40B4-BE49-F238E27FC236}">
-                <a16:creationId xmlns:a16="http://schemas.microsoft.com/office/drawing/2014/main" id="{6B43F29B-74E6-4A5E-B6EB-D7216DD025C1}"/>
+                <a16:creationId xmlns:a16="http://schemas.microsoft.com/office/drawing/2014/main" id="{3226038C-58A1-4DD8-A077-311E1049BD4D}"/>
               </a:ext>
             </a:extLst>
           </p:cNvPr>
-          <p:cNvSpPr txBox="1"/>
+          <p:cNvPicPr>
+            <a:picLocks noChangeAspect="1"/>
+          </p:cNvPicPr>
           <p:nvPr/>
-        </p:nvSpPr>
+        </p:nvPicPr>
+        <p:blipFill>
+          <a:blip r:embed="rId3">
+            <a:extLst>
+              <a:ext uri="{28A0092B-C50C-407E-A947-70E740481C1C}">
+                <a14:useLocalDpi xmlns:a14="http://schemas.microsoft.com/office/drawing/2010/main" val="0"/>
+              </a:ext>
+            </a:extLst>
+          </a:blip>
+          <a:stretch>
+            <a:fillRect/>
+          </a:stretch>
+        </p:blipFill>
         <p:spPr>
           <a:xfrm>
-            <a:off x="1114632" y="1776590"/>
-            <a:ext cx="7157258" cy="646331"/>
+            <a:off x="5919687" y="0"/>
+            <a:ext cx="6272313" cy="4760912"/>
           </a:xfrm>
           <a:prstGeom prst="rect">
             <a:avLst/>
           </a:prstGeom>
-          <a:noFill/>
         </p:spPr>
-        <p:txBody>
-          <a:bodyPr wrap="square" rtlCol="0">
-            <a:spAutoFit/>
-          </a:bodyPr>
-          <a:lstStyle/>
-          <a:p>
-            <a:pPr marL="285750" indent="-285750">
-              <a:buFont typeface="Arial" panose="020B0604020202020204" pitchFamily="34" charset="0"/>
-              <a:buChar char="•"/>
-            </a:pPr>
-            <a:r>
-              <a:rPr lang="en-US" dirty="0"/>
-              <a:t>Future improvements can be accepting command line arguments, more modular design to allow for connection with other AI systems</a:t>
-            </a:r>
-          </a:p>
-        </p:txBody>
-      </p:sp>
+      </p:pic>
     </p:spTree>
     <p:extLst>
       <p:ext uri="{BB962C8B-B14F-4D97-AF65-F5344CB8AC3E}">
-        <p14:creationId xmlns:p14="http://schemas.microsoft.com/office/powerpoint/2010/main" val="4165081873"/>
+        <p14:creationId xmlns:p14="http://schemas.microsoft.com/office/powerpoint/2010/main" val="2248519609"/>
       </p:ext>
     </p:extLst>
   </p:cSld>

</xml_diff>